<commit_message>
timedep stats ppt check done
</commit_message>
<xml_diff>
--- a/doc/workshop/forwardSampling/TimeDepSampling.pptx
+++ b/doc/workshop/forwardSampling/TimeDepSampling.pptx
@@ -34015,7 +34015,7 @@
           <a:p>
             <a:r>
               <a:rPr lang="en-US" dirty="0"/>
-              <a:t>To Continue…</a:t>
+              <a:t>Skip Option…</a:t>
             </a:r>
           </a:p>
         </p:txBody>
@@ -34043,39 +34043,25 @@
           <a:p>
             <a:r>
               <a:rPr lang="en-US" dirty="0"/>
-              <a:t>Copy:</a:t>
+              <a:t>Use:</a:t>
+            </a:r>
+          </a:p>
+          <a:p>
+            <a:pPr lvl="1"/>
+            <a:r>
+              <a:rPr lang="en-US" dirty="0" err="1"/>
+              <a:t>forwardSampling</a:t>
+            </a:r>
+            <a:r>
+              <a:rPr lang="en-US" dirty="0"/>
+              <a:t>/exercises/8_soln.xml</a:t>
             </a:r>
           </a:p>
           <a:p>
             <a:pPr lvl="1"/>
             <a:r>
               <a:rPr lang="en-US" dirty="0"/>
-              <a:t>raven/doc/workshop/</a:t>
-            </a:r>
-            <a:r>
-              <a:rPr lang="en-US" dirty="0" err="1"/>
-              <a:t>forwardSampling</a:t>
-            </a:r>
-            <a:r>
-              <a:rPr lang="en-US" dirty="0"/>
-              <a:t>/dev/8_history_sync.xml</a:t>
-            </a:r>
-          </a:p>
-          <a:p>
-            <a:pPr marL="0" indent="0">
-              <a:buNone/>
-            </a:pPr>
-            <a:r>
-              <a:rPr lang="en-US" dirty="0"/>
-              <a:t>to your exercise </a:t>
-            </a:r>
-            <a:r>
-              <a:rPr lang="en-US" dirty="0" err="1"/>
-              <a:t>dir</a:t>
-            </a:r>
-            <a:r>
-              <a:rPr lang="en-US" dirty="0"/>
-              <a:t>, use this as a basis for starting exercise 9.</a:t>
+              <a:t>Use as a basis for starting exercise 9.</a:t>
             </a:r>
           </a:p>
           <a:p>
@@ -34300,7 +34286,12 @@
             <p:ph idx="1"/>
           </p:nvPr>
         </p:nvSpPr>
-        <p:spPr/>
+        <p:spPr>
+          <a:xfrm>
+            <a:off x="455613" y="1598613"/>
+            <a:ext cx="8231187" cy="4633222"/>
+          </a:xfrm>
+        </p:spPr>
         <p:txBody>
           <a:bodyPr/>
           <a:lstStyle/>
@@ -34350,7 +34341,19 @@
             <a:pPr lvl="1"/>
             <a:r>
               <a:rPr lang="en-US" dirty="0"/>
-              <a:t>Objective: create the following plots versus “time”</a:t>
+              <a:t>Objective: </a:t>
+            </a:r>
+            <a:r>
+              <a:rPr lang="en-US" b="1" dirty="0">
+                <a:solidFill>
+                  <a:schemeClr val="accent1"/>
+                </a:solidFill>
+              </a:rPr>
+              <a:t>create the following plots </a:t>
+            </a:r>
+            <a:r>
+              <a:rPr lang="en-US" dirty="0"/>
+              <a:t>versus “time”</a:t>
             </a:r>
           </a:p>
           <a:p>

</xml_diff>

<commit_message>
updated pptx for timedep stats
</commit_message>
<xml_diff>
--- a/doc/workshop/forwardSampling/TimeDepSampling.pptx
+++ b/doc/workshop/forwardSampling/TimeDepSampling.pptx
@@ -34393,15 +34393,12 @@
           <a:p>
             <a:pPr lvl="2"/>
             <a:r>
-              <a:rPr lang="en-US" dirty="0"/>
-              <a:t>v0, y0, angle average</a:t>
+              <a:rPr lang="en-US"/>
+              <a:t>x-position, y-position: </a:t>
             </a:r>
-          </a:p>
-          <a:p>
-            <a:pPr lvl="2"/>
             <a:r>
               <a:rPr lang="en-US" dirty="0"/>
-              <a:t>x-position, y-position average, variance</a:t>
+              <a:t>average, variance</a:t>
             </a:r>
           </a:p>
           <a:p>
@@ -34662,9 +34659,31 @@
           </a:p>
           <a:p>
             <a:pPr lvl="1"/>
+            <a:endParaRPr lang="en-US" dirty="0"/>
+          </a:p>
+          <a:p>
+            <a:pPr lvl="1"/>
             <a:r>
               <a:rPr lang="en-US" dirty="0"/>
               <a:t>Find the optimal y0, v0, angle to minimize time-of-flight</a:t>
+            </a:r>
+          </a:p>
+          <a:p>
+            <a:pPr lvl="1"/>
+            <a:endParaRPr lang="en-US" dirty="0"/>
+          </a:p>
+          <a:p>
+            <a:pPr lvl="1"/>
+            <a:r>
+              <a:rPr lang="en-US" dirty="0"/>
+              <a:t>Find the optimal y0, v0, angle to maximize distance</a:t>
+            </a:r>
+          </a:p>
+          <a:p>
+            <a:pPr lvl="2"/>
+            <a:r>
+              <a:rPr lang="en-US" dirty="0"/>
+              <a:t>Constrain to maximum allowable time of flight of 2 seconds</a:t>
             </a:r>
           </a:p>
         </p:txBody>
@@ -38462,6 +38481,37 @@
             <a:pPr lvl="1"/>
             <a:r>
               <a:rPr lang="en-US" dirty="0"/>
+              <a:t>Steps (</a:t>
+            </a:r>
+            <a:r>
+              <a:rPr lang="en-US" b="1" dirty="0" err="1">
+                <a:solidFill>
+                  <a:schemeClr val="accent2"/>
+                </a:solidFill>
+              </a:rPr>
+              <a:t>PointSet</a:t>
+            </a:r>
+            <a:r>
+              <a:rPr lang="en-US" dirty="0"/>
+              <a:t> to </a:t>
+            </a:r>
+            <a:r>
+              <a:rPr lang="en-US" b="1" dirty="0" err="1">
+                <a:solidFill>
+                  <a:schemeClr val="accent2"/>
+                </a:solidFill>
+              </a:rPr>
+              <a:t>HistorySet</a:t>
+            </a:r>
+            <a:r>
+              <a:rPr lang="en-US" dirty="0"/>
+              <a:t>)</a:t>
+            </a:r>
+          </a:p>
+          <a:p>
+            <a:pPr lvl="1"/>
+            <a:r>
+              <a:rPr lang="en-US" dirty="0"/>
               <a:t>Models</a:t>
             </a:r>
           </a:p>

</xml_diff>